<commit_message>
outlined more of powerpoint.  need to make ROC and model diagnostics.  Need to log transform skewed variables and remake heatmap and violin plots
</commit_message>
<xml_diff>
--- a/viva/viva_2416963E.pptx
+++ b/viva/viva_2416963E.pptx
@@ -5,23 +5,24 @@
     <p:sldMasterId id="2147483648" r:id="rId1"/>
   </p:sldMasterIdLst>
   <p:notesMasterIdLst>
-    <p:notesMasterId r:id="rId16"/>
+    <p:notesMasterId r:id="rId17"/>
   </p:notesMasterIdLst>
   <p:sldIdLst>
     <p:sldId id="270" r:id="rId2"/>
     <p:sldId id="406" r:id="rId3"/>
     <p:sldId id="439" r:id="rId4"/>
-    <p:sldId id="444" r:id="rId5"/>
-    <p:sldId id="407" r:id="rId6"/>
-    <p:sldId id="437" r:id="rId7"/>
-    <p:sldId id="438" r:id="rId8"/>
-    <p:sldId id="445" r:id="rId9"/>
-    <p:sldId id="440" r:id="rId10"/>
-    <p:sldId id="441" r:id="rId11"/>
-    <p:sldId id="446" r:id="rId12"/>
-    <p:sldId id="442" r:id="rId13"/>
-    <p:sldId id="443" r:id="rId14"/>
-    <p:sldId id="436" r:id="rId15"/>
+    <p:sldId id="447" r:id="rId5"/>
+    <p:sldId id="444" r:id="rId6"/>
+    <p:sldId id="407" r:id="rId7"/>
+    <p:sldId id="437" r:id="rId8"/>
+    <p:sldId id="438" r:id="rId9"/>
+    <p:sldId id="445" r:id="rId10"/>
+    <p:sldId id="440" r:id="rId11"/>
+    <p:sldId id="441" r:id="rId12"/>
+    <p:sldId id="446" r:id="rId13"/>
+    <p:sldId id="442" r:id="rId14"/>
+    <p:sldId id="443" r:id="rId15"/>
+    <p:sldId id="436" r:id="rId16"/>
   </p:sldIdLst>
   <p:sldSz cx="9144000" cy="5143500" type="screen16x9"/>
   <p:notesSz cx="6858000" cy="9144000"/>
@@ -240,7 +241,7 @@
           <a:p>
             <a:fld id="{127433B5-D728-E146-B948-C37A5EC05FB8}" type="datetimeFigureOut">
               <a:rPr lang="en-US" smtClean="0"/>
-              <a:t>7/24/2019</a:t>
+              <a:t>7/29/2019</a:t>
             </a:fld>
             <a:endParaRPr lang="en-US"/>
           </a:p>
@@ -720,6 +721,12 @@
           <a:bodyPr/>
           <a:lstStyle/>
           <a:p>
+            <a:r>
+              <a:rPr lang="en-GB" dirty="0" smtClean="0">
+                <a:hlinkClick r:id="rId3"/>
+              </a:rPr>
+              <a:t>https://www.nhs.uk/conditions/acute-respiratory-distress-syndrome/</a:t>
+            </a:r>
             <a:endParaRPr lang="en-US" dirty="0"/>
           </a:p>
         </p:txBody>
@@ -804,6 +811,381 @@
           <a:bodyPr/>
           <a:lstStyle/>
           <a:p>
+            <a:r>
+              <a:rPr lang="en-GB" sz="1200" b="0" i="0" kern="1200" dirty="0" smtClean="0">
+                <a:solidFill>
+                  <a:schemeClr val="tx1"/>
+                </a:solidFill>
+                <a:effectLst/>
+                <a:latin typeface="+mn-lt"/>
+                <a:ea typeface="+mn-ea"/>
+                <a:cs typeface="+mn-cs"/>
+              </a:rPr>
+              <a:t>Early studies had shown survival benefit with use of ECMO for people in acute respiratory failure especially in the setting of </a:t>
+            </a:r>
+            <a:r>
+              <a:rPr lang="en-GB" sz="1200" b="0" i="0" u="none" strike="noStrike" kern="1200" dirty="0" smtClean="0">
+                <a:solidFill>
+                  <a:schemeClr val="tx1"/>
+                </a:solidFill>
+                <a:effectLst/>
+                <a:latin typeface="+mn-lt"/>
+                <a:ea typeface="+mn-ea"/>
+                <a:cs typeface="+mn-cs"/>
+                <a:hlinkClick r:id="rId3" tooltip="Acute respiratory distress syndrome"/>
+              </a:rPr>
+              <a:t>acute respiratory distress syndrome</a:t>
+            </a:r>
+            <a:r>
+              <a:rPr lang="en-GB" sz="1200" b="0" i="0" kern="1200" dirty="0" smtClean="0">
+                <a:solidFill>
+                  <a:schemeClr val="tx1"/>
+                </a:solidFill>
+                <a:effectLst/>
+                <a:latin typeface="+mn-lt"/>
+                <a:ea typeface="+mn-ea"/>
+                <a:cs typeface="+mn-cs"/>
+              </a:rPr>
+              <a:t>.</a:t>
+            </a:r>
+            <a:r>
+              <a:rPr lang="en-GB" sz="1200" b="0" i="0" u="none" strike="noStrike" kern="1200" baseline="30000" dirty="0" smtClean="0">
+                <a:solidFill>
+                  <a:schemeClr val="tx1"/>
+                </a:solidFill>
+                <a:effectLst/>
+                <a:latin typeface="+mn-lt"/>
+                <a:ea typeface="+mn-ea"/>
+                <a:cs typeface="+mn-cs"/>
+                <a:hlinkClick r:id="rId4"/>
+              </a:rPr>
+              <a:t>[6]</a:t>
+            </a:r>
+            <a:r>
+              <a:rPr lang="en-GB" sz="1200" b="0" i="0" u="none" strike="noStrike" kern="1200" baseline="30000" dirty="0" smtClean="0">
+                <a:solidFill>
+                  <a:schemeClr val="tx1"/>
+                </a:solidFill>
+                <a:effectLst/>
+                <a:latin typeface="+mn-lt"/>
+                <a:ea typeface="+mn-ea"/>
+                <a:cs typeface="+mn-cs"/>
+                <a:hlinkClick r:id="rId5"/>
+              </a:rPr>
+              <a:t>[7]</a:t>
+            </a:r>
+            <a:endParaRPr lang="en-GB" sz="1200" b="0" i="0" u="none" strike="noStrike" kern="1200" baseline="30000" dirty="0" smtClean="0">
+              <a:solidFill>
+                <a:schemeClr val="tx1"/>
+              </a:solidFill>
+              <a:effectLst/>
+              <a:latin typeface="+mn-lt"/>
+              <a:ea typeface="+mn-ea"/>
+              <a:cs typeface="+mn-cs"/>
+            </a:endParaRPr>
+          </a:p>
+          <a:p>
+            <a:pPr marL="171450" indent="-171450">
+              <a:buFont typeface="Arial" panose="020B0604020202020204" pitchFamily="34" charset="0"/>
+              <a:buChar char="•"/>
+            </a:pPr>
+            <a:r>
+              <a:rPr lang="en-GB" sz="1200" b="0" i="0" kern="1200" dirty="0" smtClean="0">
+                <a:solidFill>
+                  <a:schemeClr val="tx1"/>
+                </a:solidFill>
+                <a:effectLst/>
+                <a:latin typeface="+mn-lt"/>
+                <a:ea typeface="+mn-ea"/>
+                <a:cs typeface="+mn-cs"/>
+              </a:rPr>
+              <a:t>Peek, GJ; Moore, HM; Moore, N; </a:t>
+            </a:r>
+            <a:r>
+              <a:rPr lang="en-GB" sz="1200" b="0" i="0" kern="1200" dirty="0" err="1" smtClean="0">
+                <a:solidFill>
+                  <a:schemeClr val="tx1"/>
+                </a:solidFill>
+                <a:effectLst/>
+                <a:latin typeface="+mn-lt"/>
+                <a:ea typeface="+mn-ea"/>
+                <a:cs typeface="+mn-cs"/>
+              </a:rPr>
+              <a:t>Sosnowski</a:t>
+            </a:r>
+            <a:r>
+              <a:rPr lang="en-GB" sz="1200" b="0" i="0" kern="1200" dirty="0" smtClean="0">
+                <a:solidFill>
+                  <a:schemeClr val="tx1"/>
+                </a:solidFill>
+                <a:effectLst/>
+                <a:latin typeface="+mn-lt"/>
+                <a:ea typeface="+mn-ea"/>
+                <a:cs typeface="+mn-cs"/>
+              </a:rPr>
+              <a:t>, AW; </a:t>
+            </a:r>
+            <a:r>
+              <a:rPr lang="en-GB" sz="1200" b="0" i="0" kern="1200" dirty="0" err="1" smtClean="0">
+                <a:solidFill>
+                  <a:schemeClr val="tx1"/>
+                </a:solidFill>
+                <a:effectLst/>
+                <a:latin typeface="+mn-lt"/>
+                <a:ea typeface="+mn-ea"/>
+                <a:cs typeface="+mn-cs"/>
+              </a:rPr>
+              <a:t>Firmin</a:t>
+            </a:r>
+            <a:r>
+              <a:rPr lang="en-GB" sz="1200" b="0" i="0" kern="1200" dirty="0" smtClean="0">
+                <a:solidFill>
+                  <a:schemeClr val="tx1"/>
+                </a:solidFill>
+                <a:effectLst/>
+                <a:latin typeface="+mn-lt"/>
+                <a:ea typeface="+mn-ea"/>
+                <a:cs typeface="+mn-cs"/>
+              </a:rPr>
+              <a:t>, RK (1997). "Extracorporeal membrane oxygenation for adult respiratory failure". </a:t>
+            </a:r>
+            <a:r>
+              <a:rPr lang="en-GB" sz="1200" b="0" i="1" kern="1200" dirty="0" smtClean="0">
+                <a:solidFill>
+                  <a:schemeClr val="tx1"/>
+                </a:solidFill>
+                <a:effectLst/>
+                <a:latin typeface="+mn-lt"/>
+                <a:ea typeface="+mn-ea"/>
+                <a:cs typeface="+mn-cs"/>
+              </a:rPr>
+              <a:t>Chest</a:t>
+            </a:r>
+            <a:r>
+              <a:rPr lang="en-GB" sz="1200" b="0" i="0" kern="1200" dirty="0" smtClean="0">
+                <a:solidFill>
+                  <a:schemeClr val="tx1"/>
+                </a:solidFill>
+                <a:effectLst/>
+                <a:latin typeface="+mn-lt"/>
+                <a:ea typeface="+mn-ea"/>
+                <a:cs typeface="+mn-cs"/>
+              </a:rPr>
+              <a:t>. </a:t>
+            </a:r>
+          </a:p>
+          <a:p>
+            <a:pPr marL="171450" indent="-171450">
+              <a:buFont typeface="Arial" panose="020B0604020202020204" pitchFamily="34" charset="0"/>
+              <a:buChar char="•"/>
+            </a:pPr>
+            <a:r>
+              <a:rPr lang="en-GB" sz="1200" b="0" i="0" kern="1200" dirty="0" smtClean="0">
+                <a:solidFill>
+                  <a:schemeClr val="tx1"/>
+                </a:solidFill>
+                <a:effectLst/>
+                <a:latin typeface="+mn-lt"/>
+                <a:ea typeface="+mn-ea"/>
+                <a:cs typeface="+mn-cs"/>
+              </a:rPr>
+              <a:t>Lewandowski, K.; </a:t>
+            </a:r>
+            <a:r>
+              <a:rPr lang="en-GB" sz="1200" b="0" i="0" kern="1200" dirty="0" err="1" smtClean="0">
+                <a:solidFill>
+                  <a:schemeClr val="tx1"/>
+                </a:solidFill>
+                <a:effectLst/>
+                <a:latin typeface="+mn-lt"/>
+                <a:ea typeface="+mn-ea"/>
+                <a:cs typeface="+mn-cs"/>
+              </a:rPr>
+              <a:t>Rossaint</a:t>
+            </a:r>
+            <a:r>
+              <a:rPr lang="en-GB" sz="1200" b="0" i="0" kern="1200" dirty="0" smtClean="0">
+                <a:solidFill>
+                  <a:schemeClr val="tx1"/>
+                </a:solidFill>
+                <a:effectLst/>
+                <a:latin typeface="+mn-lt"/>
+                <a:ea typeface="+mn-ea"/>
+                <a:cs typeface="+mn-cs"/>
+              </a:rPr>
+              <a:t>, R.; </a:t>
+            </a:r>
+            <a:r>
+              <a:rPr lang="en-GB" sz="1200" b="0" i="0" kern="1200" dirty="0" err="1" smtClean="0">
+                <a:solidFill>
+                  <a:schemeClr val="tx1"/>
+                </a:solidFill>
+                <a:effectLst/>
+                <a:latin typeface="+mn-lt"/>
+                <a:ea typeface="+mn-ea"/>
+                <a:cs typeface="+mn-cs"/>
+              </a:rPr>
+              <a:t>Pappert</a:t>
+            </a:r>
+            <a:r>
+              <a:rPr lang="en-GB" sz="1200" b="0" i="0" kern="1200" dirty="0" smtClean="0">
+                <a:solidFill>
+                  <a:schemeClr val="tx1"/>
+                </a:solidFill>
+                <a:effectLst/>
+                <a:latin typeface="+mn-lt"/>
+                <a:ea typeface="+mn-ea"/>
+                <a:cs typeface="+mn-cs"/>
+              </a:rPr>
+              <a:t>, D.; </a:t>
+            </a:r>
+            <a:r>
+              <a:rPr lang="en-GB" sz="1200" b="0" i="0" kern="1200" dirty="0" err="1" smtClean="0">
+                <a:solidFill>
+                  <a:schemeClr val="tx1"/>
+                </a:solidFill>
+                <a:effectLst/>
+                <a:latin typeface="+mn-lt"/>
+                <a:ea typeface="+mn-ea"/>
+                <a:cs typeface="+mn-cs"/>
+              </a:rPr>
+              <a:t>Gerlach</a:t>
+            </a:r>
+            <a:r>
+              <a:rPr lang="en-GB" sz="1200" b="0" i="0" kern="1200" dirty="0" smtClean="0">
+                <a:solidFill>
+                  <a:schemeClr val="tx1"/>
+                </a:solidFill>
+                <a:effectLst/>
+                <a:latin typeface="+mn-lt"/>
+                <a:ea typeface="+mn-ea"/>
+                <a:cs typeface="+mn-cs"/>
+              </a:rPr>
+              <a:t>, H.; </a:t>
+            </a:r>
+            <a:r>
+              <a:rPr lang="en-GB" sz="1200" b="0" i="0" kern="1200" dirty="0" err="1" smtClean="0">
+                <a:solidFill>
+                  <a:schemeClr val="tx1"/>
+                </a:solidFill>
+                <a:effectLst/>
+                <a:latin typeface="+mn-lt"/>
+                <a:ea typeface="+mn-ea"/>
+                <a:cs typeface="+mn-cs"/>
+              </a:rPr>
+              <a:t>Slama</a:t>
+            </a:r>
+            <a:r>
+              <a:rPr lang="en-GB" sz="1200" b="0" i="0" kern="1200" dirty="0" smtClean="0">
+                <a:solidFill>
+                  <a:schemeClr val="tx1"/>
+                </a:solidFill>
+                <a:effectLst/>
+                <a:latin typeface="+mn-lt"/>
+                <a:ea typeface="+mn-ea"/>
+                <a:cs typeface="+mn-cs"/>
+              </a:rPr>
+              <a:t>, K.-J.; </a:t>
+            </a:r>
+            <a:r>
+              <a:rPr lang="en-GB" sz="1200" b="0" i="0" kern="1200" dirty="0" err="1" smtClean="0">
+                <a:solidFill>
+                  <a:schemeClr val="tx1"/>
+                </a:solidFill>
+                <a:effectLst/>
+                <a:latin typeface="+mn-lt"/>
+                <a:ea typeface="+mn-ea"/>
+                <a:cs typeface="+mn-cs"/>
+              </a:rPr>
+              <a:t>Weidemann</a:t>
+            </a:r>
+            <a:r>
+              <a:rPr lang="en-GB" sz="1200" b="0" i="0" kern="1200" dirty="0" smtClean="0">
+                <a:solidFill>
+                  <a:schemeClr val="tx1"/>
+                </a:solidFill>
+                <a:effectLst/>
+                <a:latin typeface="+mn-lt"/>
+                <a:ea typeface="+mn-ea"/>
+                <a:cs typeface="+mn-cs"/>
+              </a:rPr>
+              <a:t>, H.; Frey, D. J. M.; Hoffmann, O.; </a:t>
+            </a:r>
+            <a:r>
+              <a:rPr lang="en-GB" sz="1200" b="0" i="0" kern="1200" dirty="0" err="1" smtClean="0">
+                <a:solidFill>
+                  <a:schemeClr val="tx1"/>
+                </a:solidFill>
+                <a:effectLst/>
+                <a:latin typeface="+mn-lt"/>
+                <a:ea typeface="+mn-ea"/>
+                <a:cs typeface="+mn-cs"/>
+              </a:rPr>
+              <a:t>Keske</a:t>
+            </a:r>
+            <a:r>
+              <a:rPr lang="en-GB" sz="1200" b="0" i="0" kern="1200" dirty="0" smtClean="0">
+                <a:solidFill>
+                  <a:schemeClr val="tx1"/>
+                </a:solidFill>
+                <a:effectLst/>
+                <a:latin typeface="+mn-lt"/>
+                <a:ea typeface="+mn-ea"/>
+                <a:cs typeface="+mn-cs"/>
+              </a:rPr>
+              <a:t>, U. (1997). "High survival rate in 122 ARDS patients managed according to a clinical algorithm including extracorporeal membrane oxygenation". </a:t>
+            </a:r>
+            <a:r>
+              <a:rPr lang="en-GB" sz="1200" b="0" i="1" kern="1200" dirty="0" smtClean="0">
+                <a:solidFill>
+                  <a:schemeClr val="tx1"/>
+                </a:solidFill>
+                <a:effectLst/>
+                <a:latin typeface="+mn-lt"/>
+                <a:ea typeface="+mn-ea"/>
+                <a:cs typeface="+mn-cs"/>
+              </a:rPr>
+              <a:t>Intensive Care Medicine</a:t>
+            </a:r>
+            <a:r>
+              <a:rPr lang="en-GB" sz="1200" b="0" i="0" kern="1200" dirty="0" smtClean="0">
+                <a:solidFill>
+                  <a:schemeClr val="tx1"/>
+                </a:solidFill>
+                <a:effectLst/>
+                <a:latin typeface="+mn-lt"/>
+                <a:ea typeface="+mn-ea"/>
+                <a:cs typeface="+mn-cs"/>
+              </a:rPr>
+              <a:t>.</a:t>
+            </a:r>
+          </a:p>
+          <a:p>
+            <a:pPr marL="171450" indent="-171450">
+              <a:buFont typeface="Arial" panose="020B0604020202020204" pitchFamily="34" charset="0"/>
+              <a:buChar char="•"/>
+            </a:pPr>
+            <a:endParaRPr lang="en-GB" sz="1200" b="0" i="0" kern="1200" dirty="0" smtClean="0">
+              <a:solidFill>
+                <a:schemeClr val="tx1"/>
+              </a:solidFill>
+              <a:effectLst/>
+              <a:latin typeface="+mn-lt"/>
+              <a:ea typeface="+mn-ea"/>
+              <a:cs typeface="+mn-cs"/>
+            </a:endParaRPr>
+          </a:p>
+          <a:p>
+            <a:pPr marL="0" indent="0">
+              <a:buFont typeface="Arial" panose="020B0604020202020204" pitchFamily="34" charset="0"/>
+              <a:buNone/>
+            </a:pPr>
+            <a:r>
+              <a:rPr lang="en-GB" dirty="0" smtClean="0">
+                <a:hlinkClick r:id="rId6"/>
+              </a:rPr>
+              <a:t>https://www.semanticscholar.org/paper/Fifty-Years-of-Research-in-ARDS.-Is-Extracorporeal-Leprince-Pesenti/ca0ada0ed074e8c7c09fe0fdfe2f084be0758563</a:t>
+            </a:r>
             <a:endParaRPr lang="en-US" dirty="0"/>
           </a:p>
         </p:txBody>
@@ -834,7 +1216,7 @@
     </p:spTree>
     <p:extLst>
       <p:ext uri="{BB962C8B-B14F-4D97-AF65-F5344CB8AC3E}">
-        <p14:creationId xmlns:p14="http://schemas.microsoft.com/office/powerpoint/2010/main" val="4093145691"/>
+        <p14:creationId xmlns:p14="http://schemas.microsoft.com/office/powerpoint/2010/main" val="2861626134"/>
       </p:ext>
     </p:extLst>
   </p:cSld>
@@ -909,7 +1291,7 @@
           <a:p>
             <a:fld id="{34A02F00-C535-204F-B4B5-528FB2DC4FE2}" type="slidenum">
               <a:rPr lang="en-US" smtClean="0"/>
-              <a:t>13</a:t>
+              <a:t>5</a:t>
             </a:fld>
             <a:endParaRPr lang="en-US"/>
           </a:p>
@@ -918,7 +1300,7 @@
     </p:spTree>
     <p:extLst>
       <p:ext uri="{BB962C8B-B14F-4D97-AF65-F5344CB8AC3E}">
-        <p14:creationId xmlns:p14="http://schemas.microsoft.com/office/powerpoint/2010/main" val="884742870"/>
+        <p14:creationId xmlns:p14="http://schemas.microsoft.com/office/powerpoint/2010/main" val="4093145691"/>
       </p:ext>
     </p:extLst>
   </p:cSld>
@@ -994,6 +1376,90 @@
             <a:fld id="{34A02F00-C535-204F-B4B5-528FB2DC4FE2}" type="slidenum">
               <a:rPr lang="en-US" smtClean="0"/>
               <a:t>14</a:t>
+            </a:fld>
+            <a:endParaRPr lang="en-US"/>
+          </a:p>
+        </p:txBody>
+      </p:sp>
+    </p:spTree>
+    <p:extLst>
+      <p:ext uri="{BB962C8B-B14F-4D97-AF65-F5344CB8AC3E}">
+        <p14:creationId xmlns:p14="http://schemas.microsoft.com/office/powerpoint/2010/main" val="884742870"/>
+      </p:ext>
+    </p:extLst>
+  </p:cSld>
+  <p:clrMapOvr>
+    <a:masterClrMapping/>
+  </p:clrMapOvr>
+</p:notes>
+</file>
+
+<file path=ppt/notesSlides/notesSlide7.xml><?xml version="1.0" encoding="utf-8"?>
+<p:notes xmlns:a="http://schemas.openxmlformats.org/drawingml/2006/main" xmlns:r="http://schemas.openxmlformats.org/officeDocument/2006/relationships" xmlns:p="http://schemas.openxmlformats.org/presentationml/2006/main">
+  <p:cSld>
+    <p:spTree>
+      <p:nvGrpSpPr>
+        <p:cNvPr id="1" name=""/>
+        <p:cNvGrpSpPr/>
+        <p:nvPr/>
+      </p:nvGrpSpPr>
+      <p:grpSpPr>
+        <a:xfrm>
+          <a:off x="0" y="0"/>
+          <a:ext cx="0" cy="0"/>
+          <a:chOff x="0" y="0"/>
+          <a:chExt cx="0" cy="0"/>
+        </a:xfrm>
+      </p:grpSpPr>
+      <p:sp>
+        <p:nvSpPr>
+          <p:cNvPr id="2" name="Slide Image Placeholder 1"/>
+          <p:cNvSpPr>
+            <a:spLocks noGrp="1" noRot="1" noChangeAspect="1"/>
+          </p:cNvSpPr>
+          <p:nvPr>
+            <p:ph type="sldImg"/>
+          </p:nvPr>
+        </p:nvSpPr>
+        <p:spPr/>
+      </p:sp>
+      <p:sp>
+        <p:nvSpPr>
+          <p:cNvPr id="3" name="Notes Placeholder 2"/>
+          <p:cNvSpPr>
+            <a:spLocks noGrp="1"/>
+          </p:cNvSpPr>
+          <p:nvPr>
+            <p:ph type="body" idx="1"/>
+          </p:nvPr>
+        </p:nvSpPr>
+        <p:spPr/>
+        <p:txBody>
+          <a:bodyPr/>
+          <a:lstStyle/>
+          <a:p>
+            <a:endParaRPr lang="en-US" dirty="0"/>
+          </a:p>
+        </p:txBody>
+      </p:sp>
+      <p:sp>
+        <p:nvSpPr>
+          <p:cNvPr id="4" name="Slide Number Placeholder 3"/>
+          <p:cNvSpPr>
+            <a:spLocks noGrp="1"/>
+          </p:cNvSpPr>
+          <p:nvPr>
+            <p:ph type="sldNum" sz="quarter" idx="10"/>
+          </p:nvPr>
+        </p:nvSpPr>
+        <p:spPr/>
+        <p:txBody>
+          <a:bodyPr/>
+          <a:lstStyle/>
+          <a:p>
+            <a:fld id="{34A02F00-C535-204F-B4B5-528FB2DC4FE2}" type="slidenum">
+              <a:rPr lang="en-US" smtClean="0"/>
+              <a:t>15</a:t>
             </a:fld>
             <a:endParaRPr lang="en-US"/>
           </a:p>
@@ -1970,7 +2436,7 @@
           <p:cNvPr id="2" name="Picture 1" descr="The tower of the main building with the city in the background">
             <a:extLst>
               <a:ext uri="{C183D7F6-B498-43B3-948B-1728B52AA6E4}">
-                <adec:decorative xmlns="" xmlns:adec="http://schemas.microsoft.com/office/drawing/2017/decorative" val="0"/>
+                <adec:decorative xmlns:adec="http://schemas.microsoft.com/office/drawing/2017/decorative" xmlns="" val="0"/>
               </a:ext>
             </a:extLst>
           </p:cNvPr>
@@ -2147,7 +2613,7 @@
               </a14:hiddenLine>
             </a:ext>
             <a:ext uri="{FAA26D3D-D897-4be2-8F04-BA451C77F1D7}">
-              <ma14:placeholderFlag xmlns:ma14="http://schemas.microsoft.com/office/mac/drawingml/2011/main" xmlns="" val="1"/>
+              <ma14:placeholderFlag xmlns="" xmlns:ma14="http://schemas.microsoft.com/office/mac/drawingml/2011/main" val="1"/>
             </a:ext>
           </a:extLst>
         </p:spPr>
@@ -2440,7 +2906,11 @@
           <a:p>
             <a:r>
               <a:rPr lang="en-US" sz="2400" dirty="0" smtClean="0"/>
-              <a:t>Support Vector Machines</a:t>
+              <a:t>Trees / Random </a:t>
+            </a:r>
+            <a:r>
+              <a:rPr lang="en-US" sz="2400" dirty="0" err="1" smtClean="0"/>
+              <a:t>Forrests</a:t>
             </a:r>
             <a:endParaRPr lang="en-US" sz="2400" dirty="0"/>
           </a:p>
@@ -2559,7 +3029,7 @@
     </p:spTree>
     <p:extLst>
       <p:ext uri="{BB962C8B-B14F-4D97-AF65-F5344CB8AC3E}">
-        <p14:creationId xmlns:p14="http://schemas.microsoft.com/office/powerpoint/2010/main" val="3974367294"/>
+        <p14:creationId xmlns:p14="http://schemas.microsoft.com/office/powerpoint/2010/main" val="2149969440"/>
       </p:ext>
     </p:extLst>
   </p:cSld>
@@ -2678,7 +3148,7 @@
           <a:p>
             <a:r>
               <a:rPr lang="en-US" sz="2400" dirty="0" smtClean="0"/>
-              <a:t>Comparison of Methods</a:t>
+              <a:t>Support Vector Machines</a:t>
             </a:r>
             <a:endParaRPr lang="en-US" sz="2400" dirty="0"/>
           </a:p>
@@ -2797,7 +3267,7 @@
     </p:spTree>
     <p:extLst>
       <p:ext uri="{BB962C8B-B14F-4D97-AF65-F5344CB8AC3E}">
-        <p14:creationId xmlns:p14="http://schemas.microsoft.com/office/powerpoint/2010/main" val="2729839798"/>
+        <p14:creationId xmlns:p14="http://schemas.microsoft.com/office/powerpoint/2010/main" val="3974367294"/>
       </p:ext>
     </p:extLst>
   </p:cSld>
@@ -2904,6 +3374,235 @@
         <p:spPr>
           <a:xfrm>
             <a:off x="539551" y="1203599"/>
+            <a:ext cx="4104457" cy="504055"/>
+          </a:xfrm>
+          <a:prstGeom prst="rect">
+            <a:avLst/>
+          </a:prstGeom>
+        </p:spPr>
+        <p:txBody>
+          <a:bodyPr/>
+          <a:lstStyle/>
+          <a:p>
+            <a:r>
+              <a:rPr lang="en-US" sz="2400" dirty="0" smtClean="0"/>
+              <a:t>Comparison of Methods</a:t>
+            </a:r>
+            <a:endParaRPr lang="en-US" sz="2400" dirty="0"/>
+          </a:p>
+        </p:txBody>
+      </p:sp>
+      <p:sp>
+        <p:nvSpPr>
+          <p:cNvPr id="6" name="Content Placeholder 2"/>
+          <p:cNvSpPr>
+            <a:spLocks noGrp="1"/>
+          </p:cNvSpPr>
+          <p:nvPr>
+            <p:ph idx="4294967295"/>
+          </p:nvPr>
+        </p:nvSpPr>
+        <p:spPr>
+          <a:xfrm>
+            <a:off x="539551" y="1851671"/>
+            <a:ext cx="3744417" cy="3096343"/>
+          </a:xfrm>
+          <a:prstGeom prst="rect">
+            <a:avLst/>
+          </a:prstGeom>
+        </p:spPr>
+        <p:txBody>
+          <a:bodyPr/>
+          <a:lstStyle/>
+          <a:p>
+            <a:pPr marL="285750" indent="-285750">
+              <a:buFont typeface="Arial" panose="020B0604020202020204" pitchFamily="34" charset="0"/>
+              <a:buChar char="•"/>
+            </a:pPr>
+            <a:r>
+              <a:rPr lang="en-US" dirty="0" smtClean="0">
+                <a:latin typeface="Arial" charset="0"/>
+                <a:ea typeface="Arial" charset="0"/>
+                <a:cs typeface="Arial" charset="0"/>
+              </a:rPr>
+              <a:t>ROC</a:t>
+            </a:r>
+          </a:p>
+          <a:p>
+            <a:pPr marL="285750" indent="-285750">
+              <a:buFont typeface="Arial" panose="020B0604020202020204" pitchFamily="34" charset="0"/>
+              <a:buChar char="•"/>
+            </a:pPr>
+            <a:r>
+              <a:rPr lang="en-US" dirty="0" smtClean="0">
+                <a:latin typeface="Arial" charset="0"/>
+                <a:ea typeface="Arial" charset="0"/>
+                <a:cs typeface="Arial" charset="0"/>
+              </a:rPr>
+              <a:t>AUC</a:t>
+            </a:r>
+          </a:p>
+          <a:p>
+            <a:pPr marL="285750" indent="-285750">
+              <a:buFont typeface="Arial" panose="020B0604020202020204" pitchFamily="34" charset="0"/>
+              <a:buChar char="•"/>
+            </a:pPr>
+            <a:r>
+              <a:rPr lang="en-US" dirty="0" smtClean="0">
+                <a:latin typeface="Arial" charset="0"/>
+                <a:ea typeface="Arial" charset="0"/>
+                <a:cs typeface="Arial" charset="0"/>
+              </a:rPr>
+              <a:t>F1 Score</a:t>
+            </a:r>
+            <a:endParaRPr lang="en-US" dirty="0">
+              <a:latin typeface="Arial" charset="0"/>
+              <a:ea typeface="Arial" charset="0"/>
+              <a:cs typeface="Arial" charset="0"/>
+            </a:endParaRPr>
+          </a:p>
+        </p:txBody>
+      </p:sp>
+      <p:pic>
+        <p:nvPicPr>
+          <p:cNvPr id="7" name="Picture 6"/>
+          <p:cNvPicPr>
+            <a:picLocks noChangeAspect="1"/>
+          </p:cNvPicPr>
+          <p:nvPr/>
+        </p:nvPicPr>
+        <p:blipFill>
+          <a:blip r:embed="rId2">
+            <a:extLst>
+              <a:ext uri="{28A0092B-C50C-407E-A947-70E740481C1C}">
+                <a14:useLocalDpi xmlns:a14="http://schemas.microsoft.com/office/drawing/2010/main" val="0"/>
+              </a:ext>
+            </a:extLst>
+          </a:blip>
+          <a:stretch>
+            <a:fillRect/>
+          </a:stretch>
+        </p:blipFill>
+        <p:spPr>
+          <a:xfrm>
+            <a:off x="0" y="0"/>
+            <a:ext cx="9144000" cy="1352550"/>
+          </a:xfrm>
+          <a:prstGeom prst="rect">
+            <a:avLst/>
+          </a:prstGeom>
+        </p:spPr>
+      </p:pic>
+    </p:spTree>
+    <p:extLst>
+      <p:ext uri="{BB962C8B-B14F-4D97-AF65-F5344CB8AC3E}">
+        <p14:creationId xmlns:p14="http://schemas.microsoft.com/office/powerpoint/2010/main" val="2729839798"/>
+      </p:ext>
+    </p:extLst>
+  </p:cSld>
+  <p:clrMapOvr>
+    <a:masterClrMapping/>
+  </p:clrMapOvr>
+</p:sld>
+</file>
+
+<file path=ppt/slides/slide13.xml><?xml version="1.0" encoding="utf-8"?>
+<p:sld xmlns:a="http://schemas.openxmlformats.org/drawingml/2006/main" xmlns:r="http://schemas.openxmlformats.org/officeDocument/2006/relationships" xmlns:p="http://schemas.openxmlformats.org/presentationml/2006/main">
+  <p:cSld>
+    <p:spTree>
+      <p:nvGrpSpPr>
+        <p:cNvPr id="1" name=""/>
+        <p:cNvGrpSpPr/>
+        <p:nvPr/>
+      </p:nvGrpSpPr>
+      <p:grpSpPr>
+        <a:xfrm>
+          <a:off x="0" y="0"/>
+          <a:ext cx="0" cy="0"/>
+          <a:chOff x="0" y="0"/>
+          <a:chExt cx="0" cy="0"/>
+        </a:xfrm>
+      </p:grpSpPr>
+      <p:sp>
+        <p:nvSpPr>
+          <p:cNvPr id="4" name="Rectangle 3"/>
+          <p:cNvSpPr/>
+          <p:nvPr/>
+        </p:nvSpPr>
+        <p:spPr bwMode="auto">
+          <a:xfrm>
+            <a:off x="564874" y="1203599"/>
+            <a:ext cx="3719094" cy="3715612"/>
+          </a:xfrm>
+          <a:prstGeom prst="rect">
+            <a:avLst/>
+          </a:prstGeom>
+          <a:solidFill>
+            <a:schemeClr val="bg1">
+              <a:alpha val="80000"/>
+            </a:schemeClr>
+          </a:solidFill>
+          <a:ln w="9525" cap="flat" cmpd="sng" algn="ctr">
+            <a:noFill/>
+            <a:prstDash val="solid"/>
+            <a:round/>
+            <a:headEnd type="none" w="med" len="med"/>
+            <a:tailEnd type="none" w="med" len="med"/>
+          </a:ln>
+          <a:effectLst/>
+        </p:spPr>
+        <p:txBody>
+          <a:bodyPr vert="horz" wrap="square" lIns="91440" tIns="45720" rIns="91440" bIns="45720" numCol="1" rtlCol="0" anchor="t" anchorCtr="0" compatLnSpc="1">
+            <a:prstTxWarp prst="textNoShape">
+              <a:avLst/>
+            </a:prstTxWarp>
+          </a:bodyPr>
+          <a:lstStyle/>
+          <a:p>
+            <a:pPr marL="0" marR="0" indent="0" algn="l" defTabSz="914400" rtl="0" eaLnBrk="0" fontAlgn="base" latinLnBrk="0" hangingPunct="0">
+              <a:lnSpc>
+                <a:spcPct val="100000"/>
+              </a:lnSpc>
+              <a:spcBef>
+                <a:spcPct val="0"/>
+              </a:spcBef>
+              <a:spcAft>
+                <a:spcPct val="0"/>
+              </a:spcAft>
+              <a:buClrTx/>
+              <a:buSzTx/>
+              <a:buFontTx/>
+              <a:buNone/>
+              <a:tabLst/>
+            </a:pPr>
+            <a:endParaRPr kumimoji="0" lang="en-US" sz="2400" b="0" i="0" u="none" strike="noStrike" cap="none" normalizeH="0" baseline="0">
+              <a:ln>
+                <a:noFill/>
+              </a:ln>
+              <a:solidFill>
+                <a:schemeClr val="tx1"/>
+              </a:solidFill>
+              <a:effectLst/>
+              <a:latin typeface="Arial" charset="0"/>
+              <a:ea typeface="ＭＳ Ｐゴシック" charset="-128"/>
+              <a:cs typeface="ＭＳ Ｐゴシック" charset="-128"/>
+            </a:endParaRPr>
+          </a:p>
+        </p:txBody>
+      </p:sp>
+      <p:sp>
+        <p:nvSpPr>
+          <p:cNvPr id="5" name="Title 1"/>
+          <p:cNvSpPr>
+            <a:spLocks noGrp="1"/>
+          </p:cNvSpPr>
+          <p:nvPr>
+            <p:ph type="title"/>
+          </p:nvPr>
+        </p:nvSpPr>
+        <p:spPr>
+          <a:xfrm>
+            <a:off x="539551" y="1203599"/>
             <a:ext cx="4680521" cy="504055"/>
           </a:xfrm>
           <a:prstGeom prst="rect">
@@ -3045,7 +3744,7 @@
 </p:sld>
 </file>
 
-<file path=ppt/slides/slide13.xml><?xml version="1.0" encoding="utf-8"?>
+<file path=ppt/slides/slide14.xml><?xml version="1.0" encoding="utf-8"?>
 <p:sld xmlns:a="http://schemas.openxmlformats.org/drawingml/2006/main" xmlns:r="http://schemas.openxmlformats.org/officeDocument/2006/relationships" xmlns:p="http://schemas.openxmlformats.org/presentationml/2006/main">
   <p:cSld>
     <p:spTree>
@@ -3358,7 +4057,7 @@
 </p:sld>
 </file>
 
-<file path=ppt/slides/slide14.xml><?xml version="1.0" encoding="utf-8"?>
+<file path=ppt/slides/slide15.xml><?xml version="1.0" encoding="utf-8"?>
 <p:sld xmlns:a="http://schemas.openxmlformats.org/drawingml/2006/main" xmlns:r="http://schemas.openxmlformats.org/officeDocument/2006/relationships" xmlns:p="http://schemas.openxmlformats.org/presentationml/2006/main">
   <p:cSld>
     <p:spTree>
@@ -3759,7 +4458,7 @@
               </a14:hiddenLine>
             </a:ext>
             <a:ext uri="{FAA26D3D-D897-4be2-8F04-BA451C77F1D7}">
-              <ma14:placeholderFlag xmlns:ma14="http://schemas.microsoft.com/office/mac/drawingml/2011/main" xmlns="" val="1"/>
+              <ma14:placeholderFlag xmlns="" xmlns:ma14="http://schemas.microsoft.com/office/mac/drawingml/2011/main" val="1"/>
             </a:ext>
           </a:extLst>
         </p:spPr>
@@ -4173,7 +4872,7 @@
                   <a:srgbClr val="003560"/>
                 </a:solidFill>
               </a:rPr>
-              <a:t>Explanation of Background</a:t>
+              <a:t>Acute Respiratory Distress Syndrome</a:t>
             </a:r>
             <a:endParaRPr lang="en-GB" sz="1400" dirty="0">
               <a:solidFill>
@@ -4320,6 +5019,36 @@
           <a:chExt cx="0" cy="0"/>
         </a:xfrm>
       </p:grpSpPr>
+      <p:pic>
+        <p:nvPicPr>
+          <p:cNvPr id="2" name="Picture 1"/>
+          <p:cNvPicPr>
+            <a:picLocks noChangeAspect="1"/>
+          </p:cNvPicPr>
+          <p:nvPr/>
+        </p:nvPicPr>
+        <p:blipFill>
+          <a:blip r:embed="rId3">
+            <a:extLst>
+              <a:ext uri="{28A0092B-C50C-407E-A947-70E740481C1C}">
+                <a14:useLocalDpi xmlns:a14="http://schemas.microsoft.com/office/drawing/2010/main" val="0"/>
+              </a:ext>
+            </a:extLst>
+          </a:blip>
+          <a:stretch>
+            <a:fillRect/>
+          </a:stretch>
+        </p:blipFill>
+        <p:spPr>
+          <a:xfrm>
+            <a:off x="5706575" y="38100"/>
+            <a:ext cx="3437425" cy="5143500"/>
+          </a:xfrm>
+          <a:prstGeom prst="rect">
+            <a:avLst/>
+          </a:prstGeom>
+        </p:spPr>
+      </p:pic>
       <p:sp>
         <p:nvSpPr>
           <p:cNvPr id="5" name="TextBox 4"/>
@@ -4348,7 +5077,186 @@
                   <a:srgbClr val="003560"/>
                 </a:solidFill>
               </a:rPr>
-              <a:t>Aims of Project</a:t>
+              <a:t>Extracorporeal Membrane Oxygenation (ECMO)</a:t>
+            </a:r>
+            <a:endParaRPr lang="en-GB" sz="1400" dirty="0" smtClean="0">
+              <a:solidFill>
+                <a:srgbClr val="003560"/>
+              </a:solidFill>
+            </a:endParaRPr>
+          </a:p>
+          <a:p>
+            <a:pPr marL="285750" indent="-285750">
+              <a:spcBef>
+                <a:spcPts val="0"/>
+              </a:spcBef>
+              <a:spcAft>
+                <a:spcPts val="500"/>
+              </a:spcAft>
+              <a:buFont typeface="Arial" charset="0"/>
+              <a:buChar char="•"/>
+            </a:pPr>
+            <a:endParaRPr lang="en-GB" sz="1400" dirty="0" smtClean="0">
+              <a:solidFill>
+                <a:srgbClr val="003560"/>
+              </a:solidFill>
+            </a:endParaRPr>
+          </a:p>
+          <a:p>
+            <a:pPr marL="342900" indent="-342900">
+              <a:spcAft>
+                <a:spcPts val="500"/>
+              </a:spcAft>
+              <a:buFont typeface="Arial" panose="020B0604020202020204" pitchFamily="34" charset="0"/>
+              <a:buChar char="•"/>
+            </a:pPr>
+            <a:r>
+              <a:rPr lang="en-GB" sz="1600" dirty="0" smtClean="0"/>
+              <a:t>Project </a:t>
+            </a:r>
+            <a:r>
+              <a:rPr lang="en-GB" sz="1600" dirty="0"/>
+              <a:t>background </a:t>
+            </a:r>
+          </a:p>
+          <a:p>
+            <a:pPr marL="342900" indent="-342900">
+              <a:spcAft>
+                <a:spcPts val="500"/>
+              </a:spcAft>
+              <a:buFont typeface="Arial" panose="020B0604020202020204" pitchFamily="34" charset="0"/>
+              <a:buChar char="•"/>
+            </a:pPr>
+            <a:r>
+              <a:rPr lang="en-GB" sz="1600" dirty="0" smtClean="0"/>
+              <a:t>Aims </a:t>
+            </a:r>
+            <a:r>
+              <a:rPr lang="en-GB" sz="1600" dirty="0"/>
+              <a:t>of the project </a:t>
+            </a:r>
+            <a:endParaRPr lang="en-GB" sz="1600" dirty="0" smtClean="0"/>
+          </a:p>
+          <a:p>
+            <a:pPr marL="342900" indent="-342900">
+              <a:spcAft>
+                <a:spcPts val="500"/>
+              </a:spcAft>
+              <a:buFont typeface="Arial" panose="020B0604020202020204" pitchFamily="34" charset="0"/>
+              <a:buChar char="•"/>
+            </a:pPr>
+            <a:r>
+              <a:rPr lang="en-GB" sz="1600" dirty="0" smtClean="0"/>
+              <a:t>Data </a:t>
+            </a:r>
+            <a:r>
+              <a:rPr lang="en-GB" sz="1600" dirty="0"/>
+              <a:t>description</a:t>
+            </a:r>
+            <a:endParaRPr lang="en-GB" sz="1600" dirty="0">
+              <a:solidFill>
+                <a:srgbClr val="003560"/>
+              </a:solidFill>
+            </a:endParaRPr>
+          </a:p>
+          <a:p>
+            <a:pPr marL="342900" indent="-342900">
+              <a:buFont typeface="Arial" panose="020B0604020202020204" pitchFamily="34" charset="0"/>
+              <a:buChar char="•"/>
+            </a:pPr>
+            <a:endParaRPr lang="en-GB" sz="1100" dirty="0"/>
+          </a:p>
+        </p:txBody>
+      </p:sp>
+      <p:pic>
+        <p:nvPicPr>
+          <p:cNvPr id="8" name="Picture 7"/>
+          <p:cNvPicPr>
+            <a:picLocks noChangeAspect="1"/>
+          </p:cNvPicPr>
+          <p:nvPr/>
+        </p:nvPicPr>
+        <p:blipFill>
+          <a:blip r:embed="rId4">
+            <a:extLst>
+              <a:ext uri="{28A0092B-C50C-407E-A947-70E740481C1C}">
+                <a14:useLocalDpi xmlns:a14="http://schemas.microsoft.com/office/drawing/2010/main" val="0"/>
+              </a:ext>
+            </a:extLst>
+          </a:blip>
+          <a:stretch>
+            <a:fillRect/>
+          </a:stretch>
+        </p:blipFill>
+        <p:spPr>
+          <a:xfrm>
+            <a:off x="0" y="0"/>
+            <a:ext cx="9144000" cy="1352550"/>
+          </a:xfrm>
+          <a:prstGeom prst="rect">
+            <a:avLst/>
+          </a:prstGeom>
+        </p:spPr>
+      </p:pic>
+    </p:spTree>
+    <p:extLst>
+      <p:ext uri="{BB962C8B-B14F-4D97-AF65-F5344CB8AC3E}">
+        <p14:creationId xmlns:p14="http://schemas.microsoft.com/office/powerpoint/2010/main" val="1925587919"/>
+      </p:ext>
+    </p:extLst>
+  </p:cSld>
+  <p:clrMapOvr>
+    <a:masterClrMapping/>
+  </p:clrMapOvr>
+</p:sld>
+</file>
+
+<file path=ppt/slides/slide5.xml><?xml version="1.0" encoding="utf-8"?>
+<p:sld xmlns:a="http://schemas.openxmlformats.org/drawingml/2006/main" xmlns:r="http://schemas.openxmlformats.org/officeDocument/2006/relationships" xmlns:p="http://schemas.openxmlformats.org/presentationml/2006/main">
+  <p:cSld>
+    <p:spTree>
+      <p:nvGrpSpPr>
+        <p:cNvPr id="1" name=""/>
+        <p:cNvGrpSpPr/>
+        <p:nvPr/>
+      </p:nvGrpSpPr>
+      <p:grpSpPr>
+        <a:xfrm>
+          <a:off x="0" y="0"/>
+          <a:ext cx="0" cy="0"/>
+          <a:chOff x="0" y="0"/>
+          <a:chExt cx="0" cy="0"/>
+        </a:xfrm>
+      </p:grpSpPr>
+      <p:sp>
+        <p:nvSpPr>
+          <p:cNvPr id="5" name="TextBox 4"/>
+          <p:cNvSpPr txBox="1"/>
+          <p:nvPr/>
+        </p:nvSpPr>
+        <p:spPr>
+          <a:xfrm>
+            <a:off x="107505" y="1203598"/>
+            <a:ext cx="8568951" cy="1841530"/>
+          </a:xfrm>
+          <a:prstGeom prst="rect">
+            <a:avLst/>
+          </a:prstGeom>
+          <a:noFill/>
+        </p:spPr>
+        <p:txBody>
+          <a:bodyPr wrap="square" rtlCol="0">
+            <a:spAutoFit/>
+          </a:bodyPr>
+          <a:lstStyle/>
+          <a:p>
+            <a:r>
+              <a:rPr lang="en-GB" b="1" dirty="0" smtClean="0">
+                <a:solidFill>
+                  <a:srgbClr val="003560"/>
+                </a:solidFill>
+              </a:rPr>
+              <a:t>Questions of Interest</a:t>
             </a:r>
             <a:endParaRPr lang="en-GB" sz="1400" dirty="0">
               <a:solidFill>
@@ -4415,7 +5323,6 @@
               <a:rPr lang="en-GB" sz="1600" dirty="0" smtClean="0"/>
               <a:t> variables or just a subset to make accurate predictions?</a:t>
             </a:r>
-            <a:endParaRPr lang="en-GB" sz="1600" dirty="0" smtClean="0"/>
           </a:p>
           <a:p>
             <a:pPr marL="342900" indent="-342900">
@@ -4478,244 +5385,6 @@
     <p:extLst>
       <p:ext uri="{BB962C8B-B14F-4D97-AF65-F5344CB8AC3E}">
         <p14:creationId xmlns:p14="http://schemas.microsoft.com/office/powerpoint/2010/main" val="2575358949"/>
-      </p:ext>
-    </p:extLst>
-  </p:cSld>
-  <p:clrMapOvr>
-    <a:masterClrMapping/>
-  </p:clrMapOvr>
-</p:sld>
-</file>
-
-<file path=ppt/slides/slide5.xml><?xml version="1.0" encoding="utf-8"?>
-<p:sld xmlns:a="http://schemas.openxmlformats.org/drawingml/2006/main" xmlns:r="http://schemas.openxmlformats.org/officeDocument/2006/relationships" xmlns:p="http://schemas.openxmlformats.org/presentationml/2006/main">
-  <p:cSld>
-    <p:spTree>
-      <p:nvGrpSpPr>
-        <p:cNvPr id="1" name=""/>
-        <p:cNvGrpSpPr/>
-        <p:nvPr/>
-      </p:nvGrpSpPr>
-      <p:grpSpPr>
-        <a:xfrm>
-          <a:off x="0" y="0"/>
-          <a:ext cx="0" cy="0"/>
-          <a:chOff x="0" y="0"/>
-          <a:chExt cx="0" cy="0"/>
-        </a:xfrm>
-      </p:grpSpPr>
-      <p:sp>
-        <p:nvSpPr>
-          <p:cNvPr id="4" name="Rectangle 3"/>
-          <p:cNvSpPr/>
-          <p:nvPr/>
-        </p:nvSpPr>
-        <p:spPr bwMode="auto">
-          <a:xfrm>
-            <a:off x="564874" y="1203599"/>
-            <a:ext cx="3719094" cy="3715612"/>
-          </a:xfrm>
-          <a:prstGeom prst="rect">
-            <a:avLst/>
-          </a:prstGeom>
-          <a:solidFill>
-            <a:schemeClr val="bg1">
-              <a:alpha val="80000"/>
-            </a:schemeClr>
-          </a:solidFill>
-          <a:ln w="9525" cap="flat" cmpd="sng" algn="ctr">
-            <a:noFill/>
-            <a:prstDash val="solid"/>
-            <a:round/>
-            <a:headEnd type="none" w="med" len="med"/>
-            <a:tailEnd type="none" w="med" len="med"/>
-          </a:ln>
-          <a:effectLst/>
-        </p:spPr>
-        <p:txBody>
-          <a:bodyPr vert="horz" wrap="square" lIns="91440" tIns="45720" rIns="91440" bIns="45720" numCol="1" rtlCol="0" anchor="t" anchorCtr="0" compatLnSpc="1">
-            <a:prstTxWarp prst="textNoShape">
-              <a:avLst/>
-            </a:prstTxWarp>
-          </a:bodyPr>
-          <a:lstStyle/>
-          <a:p>
-            <a:pPr marL="0" marR="0" indent="0" algn="l" defTabSz="914400" rtl="0" eaLnBrk="0" fontAlgn="base" latinLnBrk="0" hangingPunct="0">
-              <a:lnSpc>
-                <a:spcPct val="100000"/>
-              </a:lnSpc>
-              <a:spcBef>
-                <a:spcPct val="0"/>
-              </a:spcBef>
-              <a:spcAft>
-                <a:spcPct val="0"/>
-              </a:spcAft>
-              <a:buClrTx/>
-              <a:buSzTx/>
-              <a:buFontTx/>
-              <a:buNone/>
-              <a:tabLst/>
-            </a:pPr>
-            <a:endParaRPr kumimoji="0" lang="en-US" sz="2400" b="0" i="0" u="none" strike="noStrike" cap="none" normalizeH="0" baseline="0">
-              <a:ln>
-                <a:noFill/>
-              </a:ln>
-              <a:solidFill>
-                <a:schemeClr val="tx1"/>
-              </a:solidFill>
-              <a:effectLst/>
-              <a:latin typeface="Arial" charset="0"/>
-              <a:ea typeface="ＭＳ Ｐゴシック" charset="-128"/>
-              <a:cs typeface="ＭＳ Ｐゴシック" charset="-128"/>
-            </a:endParaRPr>
-          </a:p>
-        </p:txBody>
-      </p:sp>
-      <p:sp>
-        <p:nvSpPr>
-          <p:cNvPr id="5" name="Title 1"/>
-          <p:cNvSpPr>
-            <a:spLocks noGrp="1"/>
-          </p:cNvSpPr>
-          <p:nvPr>
-            <p:ph type="title"/>
-          </p:nvPr>
-        </p:nvSpPr>
-        <p:spPr>
-          <a:xfrm>
-            <a:off x="539551" y="1203599"/>
-            <a:ext cx="4104457" cy="504055"/>
-          </a:xfrm>
-          <a:prstGeom prst="rect">
-            <a:avLst/>
-          </a:prstGeom>
-        </p:spPr>
-        <p:txBody>
-          <a:bodyPr/>
-          <a:lstStyle/>
-          <a:p>
-            <a:r>
-              <a:rPr lang="en-US" sz="2400" dirty="0" smtClean="0"/>
-              <a:t>Exploratory Data Analysis</a:t>
-            </a:r>
-            <a:endParaRPr lang="en-US" sz="2400" dirty="0"/>
-          </a:p>
-        </p:txBody>
-      </p:sp>
-      <p:sp>
-        <p:nvSpPr>
-          <p:cNvPr id="6" name="Content Placeholder 2"/>
-          <p:cNvSpPr>
-            <a:spLocks noGrp="1"/>
-          </p:cNvSpPr>
-          <p:nvPr>
-            <p:ph idx="4294967295"/>
-          </p:nvPr>
-        </p:nvSpPr>
-        <p:spPr>
-          <a:xfrm>
-            <a:off x="539551" y="1851671"/>
-            <a:ext cx="3744417" cy="3096343"/>
-          </a:xfrm>
-          <a:prstGeom prst="rect">
-            <a:avLst/>
-          </a:prstGeom>
-        </p:spPr>
-        <p:txBody>
-          <a:bodyPr/>
-          <a:lstStyle/>
-          <a:p>
-            <a:pPr marL="285750" indent="-285750">
-              <a:buFont typeface="Arial" panose="020B0604020202020204" pitchFamily="34" charset="0"/>
-              <a:buChar char="•"/>
-            </a:pPr>
-            <a:r>
-              <a:rPr lang="en-US" dirty="0">
-                <a:latin typeface="Arial" charset="0"/>
-                <a:ea typeface="Arial" charset="0"/>
-                <a:cs typeface="Arial" charset="0"/>
-              </a:rPr>
-              <a:t>Your body text should be minimum size 16. </a:t>
-            </a:r>
-          </a:p>
-          <a:p>
-            <a:pPr marL="285750" indent="-285750">
-              <a:buFont typeface="Arial" panose="020B0604020202020204" pitchFamily="34" charset="0"/>
-              <a:buChar char="•"/>
-            </a:pPr>
-            <a:r>
-              <a:rPr lang="en-US" dirty="0">
-                <a:latin typeface="Arial" charset="0"/>
-                <a:ea typeface="Arial" charset="0"/>
-                <a:cs typeface="Arial" charset="0"/>
-              </a:rPr>
-              <a:t>We recommend that you use headings or bullet points</a:t>
-            </a:r>
-          </a:p>
-          <a:p>
-            <a:pPr marL="285750" indent="-285750">
-              <a:buFont typeface="Arial" panose="020B0604020202020204" pitchFamily="34" charset="0"/>
-              <a:buChar char="•"/>
-            </a:pPr>
-            <a:r>
-              <a:rPr lang="en-US" dirty="0">
-                <a:latin typeface="Arial" charset="0"/>
-                <a:ea typeface="Arial" charset="0"/>
-                <a:cs typeface="Arial" charset="0"/>
-              </a:rPr>
-              <a:t>Your audience want to hear and see you present not read from a slide.</a:t>
-            </a:r>
-          </a:p>
-          <a:p>
-            <a:pPr marL="292100" indent="-285750">
-              <a:buFont typeface="Arial" charset="0"/>
-              <a:buChar char="•"/>
-            </a:pPr>
-            <a:r>
-              <a:rPr lang="en-US" dirty="0">
-                <a:latin typeface="Arial" charset="0"/>
-                <a:ea typeface="Arial" charset="0"/>
-                <a:cs typeface="Arial" charset="0"/>
-              </a:rPr>
-              <a:t>To insert an image, right-click (ctrl + click Mac) and select ‘send to back’, to place it behind the University marque at the top. </a:t>
-            </a:r>
-          </a:p>
-        </p:txBody>
-      </p:sp>
-      <p:pic>
-        <p:nvPicPr>
-          <p:cNvPr id="7" name="Picture 6"/>
-          <p:cNvPicPr>
-            <a:picLocks noChangeAspect="1"/>
-          </p:cNvPicPr>
-          <p:nvPr/>
-        </p:nvPicPr>
-        <p:blipFill>
-          <a:blip r:embed="rId2">
-            <a:extLst>
-              <a:ext uri="{28A0092B-C50C-407E-A947-70E740481C1C}">
-                <a14:useLocalDpi xmlns:a14="http://schemas.microsoft.com/office/drawing/2010/main" val="0"/>
-              </a:ext>
-            </a:extLst>
-          </a:blip>
-          <a:stretch>
-            <a:fillRect/>
-          </a:stretch>
-        </p:blipFill>
-        <p:spPr>
-          <a:xfrm>
-            <a:off x="0" y="0"/>
-            <a:ext cx="9144000" cy="1352550"/>
-          </a:xfrm>
-          <a:prstGeom prst="rect">
-            <a:avLst/>
-          </a:prstGeom>
-        </p:spPr>
-      </p:pic>
-    </p:spTree>
-    <p:extLst>
-      <p:ext uri="{BB962C8B-B14F-4D97-AF65-F5344CB8AC3E}">
-        <p14:creationId xmlns:p14="http://schemas.microsoft.com/office/powerpoint/2010/main" val="2060812485"/>
       </p:ext>
     </p:extLst>
   </p:cSld>
@@ -4834,7 +5503,7 @@
           <a:p>
             <a:r>
               <a:rPr lang="en-US" sz="2400" dirty="0" smtClean="0"/>
-              <a:t>Logistic Regression</a:t>
+              <a:t>Exploratory Data Analysis</a:t>
             </a:r>
             <a:endParaRPr lang="en-US" sz="2400" dirty="0"/>
           </a:p>
@@ -4953,7 +5622,7 @@
     </p:spTree>
     <p:extLst>
       <p:ext uri="{BB962C8B-B14F-4D97-AF65-F5344CB8AC3E}">
-        <p14:creationId xmlns:p14="http://schemas.microsoft.com/office/powerpoint/2010/main" val="3149348495"/>
+        <p14:creationId xmlns:p14="http://schemas.microsoft.com/office/powerpoint/2010/main" val="2060812485"/>
       </p:ext>
     </p:extLst>
   </p:cSld>
@@ -5072,11 +5741,7 @@
           <a:p>
             <a:r>
               <a:rPr lang="en-US" sz="2400" dirty="0" smtClean="0"/>
-              <a:t>K-Nearest </a:t>
-            </a:r>
-            <a:r>
-              <a:rPr lang="en-US" sz="2400" dirty="0" err="1" smtClean="0"/>
-              <a:t>Neighbours</a:t>
+              <a:t>Logistic Regression</a:t>
             </a:r>
             <a:endParaRPr lang="en-US" sz="2400" dirty="0"/>
           </a:p>
@@ -5110,18 +5775,55 @@
               <a:buChar char="•"/>
             </a:pPr>
             <a:r>
-              <a:rPr lang="en-US" dirty="0" smtClean="0">
+              <a:rPr lang="en-US" dirty="0">
                 <a:latin typeface="Arial" charset="0"/>
                 <a:ea typeface="Arial" charset="0"/>
                 <a:cs typeface="Arial" charset="0"/>
               </a:rPr>
-              <a:t>Only for continuous variables</a:t>
-            </a:r>
-            <a:endParaRPr lang="en-US" dirty="0">
-              <a:latin typeface="Arial" charset="0"/>
-              <a:ea typeface="Arial" charset="0"/>
-              <a:cs typeface="Arial" charset="0"/>
-            </a:endParaRPr>
+              <a:t>Your body text should be minimum size 16. </a:t>
+            </a:r>
+          </a:p>
+          <a:p>
+            <a:pPr marL="285750" indent="-285750">
+              <a:buFont typeface="Arial" panose="020B0604020202020204" pitchFamily="34" charset="0"/>
+              <a:buChar char="•"/>
+            </a:pPr>
+            <a:r>
+              <a:rPr lang="en-US" dirty="0">
+                <a:latin typeface="Arial" charset="0"/>
+                <a:ea typeface="Arial" charset="0"/>
+                <a:cs typeface="Arial" charset="0"/>
+              </a:rPr>
+              <a:t>We recommend that you use headings or bullet points</a:t>
+            </a:r>
+          </a:p>
+          <a:p>
+            <a:pPr marL="285750" indent="-285750">
+              <a:buFont typeface="Arial" panose="020B0604020202020204" pitchFamily="34" charset="0"/>
+              <a:buChar char="•"/>
+            </a:pPr>
+            <a:r>
+              <a:rPr lang="en-US" dirty="0">
+                <a:latin typeface="Arial" charset="0"/>
+                <a:ea typeface="Arial" charset="0"/>
+                <a:cs typeface="Arial" charset="0"/>
+              </a:rPr>
+              <a:t>Your audience want to hear and see you present not read from a slide.</a:t>
+            </a:r>
+          </a:p>
+          <a:p>
+            <a:pPr marL="292100" indent="-285750">
+              <a:buFont typeface="Arial" charset="0"/>
+              <a:buChar char="•"/>
+            </a:pPr>
+            <a:r>
+              <a:rPr lang="en-US" dirty="0">
+                <a:latin typeface="Arial" charset="0"/>
+                <a:ea typeface="Arial" charset="0"/>
+                <a:cs typeface="Arial" charset="0"/>
+              </a:rPr>
+              <a:t>To insert an image, right-click (ctrl + click Mac) and select ‘send to back’, to place it behind the University marque at the top. </a:t>
+            </a:r>
           </a:p>
         </p:txBody>
       </p:sp>
@@ -5158,7 +5860,7 @@
     </p:spTree>
     <p:extLst>
       <p:ext uri="{BB962C8B-B14F-4D97-AF65-F5344CB8AC3E}">
-        <p14:creationId xmlns:p14="http://schemas.microsoft.com/office/powerpoint/2010/main" val="98188770"/>
+        <p14:creationId xmlns:p14="http://schemas.microsoft.com/office/powerpoint/2010/main" val="3149348495"/>
       </p:ext>
     </p:extLst>
   </p:cSld>
@@ -5277,7 +5979,11 @@
           <a:p>
             <a:r>
               <a:rPr lang="en-US" sz="2400" dirty="0" smtClean="0"/>
-              <a:t>LDA/QDA</a:t>
+              <a:t>K-Nearest </a:t>
+            </a:r>
+            <a:r>
+              <a:rPr lang="en-US" sz="2400" dirty="0" err="1" smtClean="0"/>
+              <a:t>Neighbours</a:t>
             </a:r>
             <a:endParaRPr lang="en-US" sz="2400" dirty="0"/>
           </a:p>
@@ -5359,7 +6065,7 @@
     </p:spTree>
     <p:extLst>
       <p:ext uri="{BB962C8B-B14F-4D97-AF65-F5344CB8AC3E}">
-        <p14:creationId xmlns:p14="http://schemas.microsoft.com/office/powerpoint/2010/main" val="2224238787"/>
+        <p14:creationId xmlns:p14="http://schemas.microsoft.com/office/powerpoint/2010/main" val="98188770"/>
       </p:ext>
     </p:extLst>
   </p:cSld>
@@ -5478,11 +6184,7 @@
           <a:p>
             <a:r>
               <a:rPr lang="en-US" sz="2400" dirty="0" smtClean="0"/>
-              <a:t>Trees / Random </a:t>
-            </a:r>
-            <a:r>
-              <a:rPr lang="en-US" sz="2400" dirty="0" err="1" smtClean="0"/>
-              <a:t>Forrests</a:t>
+              <a:t>LDA/QDA</a:t>
             </a:r>
             <a:endParaRPr lang="en-US" sz="2400" dirty="0"/>
           </a:p>
@@ -5516,55 +6218,18 @@
               <a:buChar char="•"/>
             </a:pPr>
             <a:r>
-              <a:rPr lang="en-US" dirty="0">
+              <a:rPr lang="en-US" dirty="0" smtClean="0">
                 <a:latin typeface="Arial" charset="0"/>
                 <a:ea typeface="Arial" charset="0"/>
                 <a:cs typeface="Arial" charset="0"/>
               </a:rPr>
-              <a:t>Your body text should be minimum size 16. </a:t>
-            </a:r>
-          </a:p>
-          <a:p>
-            <a:pPr marL="285750" indent="-285750">
-              <a:buFont typeface="Arial" panose="020B0604020202020204" pitchFamily="34" charset="0"/>
-              <a:buChar char="•"/>
-            </a:pPr>
-            <a:r>
-              <a:rPr lang="en-US" dirty="0">
-                <a:latin typeface="Arial" charset="0"/>
-                <a:ea typeface="Arial" charset="0"/>
-                <a:cs typeface="Arial" charset="0"/>
-              </a:rPr>
-              <a:t>We recommend that you use headings or bullet points</a:t>
-            </a:r>
-          </a:p>
-          <a:p>
-            <a:pPr marL="285750" indent="-285750">
-              <a:buFont typeface="Arial" panose="020B0604020202020204" pitchFamily="34" charset="0"/>
-              <a:buChar char="•"/>
-            </a:pPr>
-            <a:r>
-              <a:rPr lang="en-US" dirty="0">
-                <a:latin typeface="Arial" charset="0"/>
-                <a:ea typeface="Arial" charset="0"/>
-                <a:cs typeface="Arial" charset="0"/>
-              </a:rPr>
-              <a:t>Your audience want to hear and see you present not read from a slide.</a:t>
-            </a:r>
-          </a:p>
-          <a:p>
-            <a:pPr marL="292100" indent="-285750">
-              <a:buFont typeface="Arial" charset="0"/>
-              <a:buChar char="•"/>
-            </a:pPr>
-            <a:r>
-              <a:rPr lang="en-US" dirty="0">
-                <a:latin typeface="Arial" charset="0"/>
-                <a:ea typeface="Arial" charset="0"/>
-                <a:cs typeface="Arial" charset="0"/>
-              </a:rPr>
-              <a:t>To insert an image, right-click (ctrl + click Mac) and select ‘send to back’, to place it behind the University marque at the top. </a:t>
-            </a:r>
+              <a:t>Only for continuous variables</a:t>
+            </a:r>
+            <a:endParaRPr lang="en-US" dirty="0">
+              <a:latin typeface="Arial" charset="0"/>
+              <a:ea typeface="Arial" charset="0"/>
+              <a:cs typeface="Arial" charset="0"/>
+            </a:endParaRPr>
           </a:p>
         </p:txBody>
       </p:sp>
@@ -5601,7 +6266,7 @@
     </p:spTree>
     <p:extLst>
       <p:ext uri="{BB962C8B-B14F-4D97-AF65-F5344CB8AC3E}">
-        <p14:creationId xmlns:p14="http://schemas.microsoft.com/office/powerpoint/2010/main" val="2149969440"/>
+        <p14:creationId xmlns:p14="http://schemas.microsoft.com/office/powerpoint/2010/main" val="2224238787"/>
       </p:ext>
     </p:extLst>
   </p:cSld>

</xml_diff>